<commit_message>
Schematic design for the half-bridge board is almost completed except short-circuit protection.
</commit_message>
<xml_diff>
--- a/Weekly Reports/2019.09.18 - 2019.09.25 Report.pptx
+++ b/Weekly Reports/2019.09.18 - 2019.09.25 Report.pptx
@@ -5,7 +5,7 @@
     <p:sldMasterId id="2147483648" r:id="rId1"/>
   </p:sldMasterIdLst>
   <p:notesMasterIdLst>
-    <p:notesMasterId r:id="rId11"/>
+    <p:notesMasterId r:id="rId12"/>
   </p:notesMasterIdLst>
   <p:sldIdLst>
     <p:sldId id="265" r:id="rId2"/>
@@ -17,6 +17,7 @@
     <p:sldId id="272" r:id="rId8"/>
     <p:sldId id="273" r:id="rId9"/>
     <p:sldId id="274" r:id="rId10"/>
+    <p:sldId id="275" r:id="rId11"/>
   </p:sldIdLst>
   <p:sldSz cx="12192000" cy="6858000"/>
   <p:notesSz cx="6858000" cy="9144000"/>
@@ -205,7 +206,7 @@
           <a:p>
             <a:fld id="{6967AB47-6931-48C6-B7ED-326D1228AFBA}" type="datetimeFigureOut">
               <a:rPr lang="tr-TR" smtClean="0"/>
-              <a:t>24.09.2019</a:t>
+              <a:t>26.09.2019</a:t>
             </a:fld>
             <a:endParaRPr lang="tr-TR"/>
           </a:p>
@@ -557,6 +558,90 @@
 </p:notes>
 </file>
 
+<file path=ppt/notesSlides/notesSlide2.xml><?xml version="1.0" encoding="utf-8"?>
+<p:notes xmlns:a="http://schemas.openxmlformats.org/drawingml/2006/main" xmlns:r="http://schemas.openxmlformats.org/officeDocument/2006/relationships" xmlns:p="http://schemas.openxmlformats.org/presentationml/2006/main">
+  <p:cSld>
+    <p:spTree>
+      <p:nvGrpSpPr>
+        <p:cNvPr id="1" name=""/>
+        <p:cNvGrpSpPr/>
+        <p:nvPr/>
+      </p:nvGrpSpPr>
+      <p:grpSpPr>
+        <a:xfrm>
+          <a:off x="0" y="0"/>
+          <a:ext cx="0" cy="0"/>
+          <a:chOff x="0" y="0"/>
+          <a:chExt cx="0" cy="0"/>
+        </a:xfrm>
+      </p:grpSpPr>
+      <p:sp>
+        <p:nvSpPr>
+          <p:cNvPr id="2" name="Slide Image Placeholder 1"/>
+          <p:cNvSpPr>
+            <a:spLocks noGrp="1" noRot="1" noChangeAspect="1"/>
+          </p:cNvSpPr>
+          <p:nvPr>
+            <p:ph type="sldImg"/>
+          </p:nvPr>
+        </p:nvSpPr>
+        <p:spPr/>
+      </p:sp>
+      <p:sp>
+        <p:nvSpPr>
+          <p:cNvPr id="3" name="Notes Placeholder 2"/>
+          <p:cNvSpPr>
+            <a:spLocks noGrp="1"/>
+          </p:cNvSpPr>
+          <p:nvPr>
+            <p:ph type="body" idx="1"/>
+          </p:nvPr>
+        </p:nvSpPr>
+        <p:spPr/>
+        <p:txBody>
+          <a:bodyPr/>
+          <a:lstStyle/>
+          <a:p>
+            <a:endParaRPr lang="tr-TR" dirty="0"/>
+          </a:p>
+        </p:txBody>
+      </p:sp>
+      <p:sp>
+        <p:nvSpPr>
+          <p:cNvPr id="4" name="Slide Number Placeholder 3"/>
+          <p:cNvSpPr>
+            <a:spLocks noGrp="1"/>
+          </p:cNvSpPr>
+          <p:nvPr>
+            <p:ph type="sldNum" sz="quarter" idx="10"/>
+          </p:nvPr>
+        </p:nvSpPr>
+        <p:spPr/>
+        <p:txBody>
+          <a:bodyPr/>
+          <a:lstStyle/>
+          <a:p>
+            <a:fld id="{B6112101-3760-4CAC-BF0E-15BB3278C8BF}" type="slidenum">
+              <a:rPr lang="tr-TR" smtClean="0"/>
+              <a:t>10</a:t>
+            </a:fld>
+            <a:endParaRPr lang="tr-TR"/>
+          </a:p>
+        </p:txBody>
+      </p:sp>
+    </p:spTree>
+    <p:extLst>
+      <p:ext uri="{BB962C8B-B14F-4D97-AF65-F5344CB8AC3E}">
+        <p14:creationId xmlns:p14="http://schemas.microsoft.com/office/powerpoint/2010/main" val="2532079302"/>
+      </p:ext>
+    </p:extLst>
+  </p:cSld>
+  <p:clrMapOvr>
+    <a:masterClrMapping/>
+  </p:clrMapOvr>
+</p:notes>
+</file>
+
 <file path=ppt/slideLayouts/slideLayout1.xml><?xml version="1.0" encoding="utf-8"?>
 <p:sldLayout xmlns:a="http://schemas.openxmlformats.org/drawingml/2006/main" xmlns:r="http://schemas.openxmlformats.org/officeDocument/2006/relationships" xmlns:p="http://schemas.openxmlformats.org/presentationml/2006/main" type="title" preserve="1">
   <p:cSld name="Title Slide">
@@ -688,7 +773,7 @@
           <a:p>
             <a:fld id="{BD3B3769-65FE-41EA-85B6-D9F2AF76CBA9}" type="datetime1">
               <a:rPr lang="tr-TR" smtClean="0"/>
-              <a:t>24.09.2019</a:t>
+              <a:t>26.09.2019</a:t>
             </a:fld>
             <a:endParaRPr lang="tr-TR"/>
           </a:p>
@@ -858,7 +943,7 @@
           <a:p>
             <a:fld id="{2962A6A9-D976-4BDA-B10C-66B2B9DE9B4C}" type="datetime1">
               <a:rPr lang="tr-TR" smtClean="0"/>
-              <a:t>24.09.2019</a:t>
+              <a:t>26.09.2019</a:t>
             </a:fld>
             <a:endParaRPr lang="tr-TR"/>
           </a:p>
@@ -1038,7 +1123,7 @@
           <a:p>
             <a:fld id="{5600552A-E4D4-4B40-9929-1D3FB71F71FF}" type="datetime1">
               <a:rPr lang="tr-TR" smtClean="0"/>
-              <a:t>24.09.2019</a:t>
+              <a:t>26.09.2019</a:t>
             </a:fld>
             <a:endParaRPr lang="tr-TR"/>
           </a:p>
@@ -1208,7 +1293,7 @@
           <a:p>
             <a:fld id="{F9A85ECC-3CE4-4AD0-8EC5-3A36763AA76F}" type="datetime1">
               <a:rPr lang="tr-TR" smtClean="0"/>
-              <a:t>24.09.2019</a:t>
+              <a:t>26.09.2019</a:t>
             </a:fld>
             <a:endParaRPr lang="tr-TR"/>
           </a:p>
@@ -1454,7 +1539,7 @@
           <a:p>
             <a:fld id="{39F6AA4B-9646-44CC-B325-B50A183D6636}" type="datetime1">
               <a:rPr lang="tr-TR" smtClean="0"/>
-              <a:t>24.09.2019</a:t>
+              <a:t>26.09.2019</a:t>
             </a:fld>
             <a:endParaRPr lang="tr-TR"/>
           </a:p>
@@ -1686,7 +1771,7 @@
           <a:p>
             <a:fld id="{FD69D89B-A78C-481C-B4BE-82E51E30BA9C}" type="datetime1">
               <a:rPr lang="tr-TR" smtClean="0"/>
-              <a:t>24.09.2019</a:t>
+              <a:t>26.09.2019</a:t>
             </a:fld>
             <a:endParaRPr lang="tr-TR"/>
           </a:p>
@@ -2053,7 +2138,7 @@
           <a:p>
             <a:fld id="{473BE270-57FE-4717-982D-F02DFB5BECD5}" type="datetime1">
               <a:rPr lang="tr-TR" smtClean="0"/>
-              <a:t>24.09.2019</a:t>
+              <a:t>26.09.2019</a:t>
             </a:fld>
             <a:endParaRPr lang="tr-TR"/>
           </a:p>
@@ -2171,7 +2256,7 @@
           <a:p>
             <a:fld id="{BFAEDD45-6991-4862-9E84-DDF92EF341CB}" type="datetime1">
               <a:rPr lang="tr-TR" smtClean="0"/>
-              <a:t>24.09.2019</a:t>
+              <a:t>26.09.2019</a:t>
             </a:fld>
             <a:endParaRPr lang="tr-TR"/>
           </a:p>
@@ -2266,7 +2351,7 @@
           <a:p>
             <a:fld id="{23EE56C6-14E9-4870-96BE-3550760A1300}" type="datetime1">
               <a:rPr lang="tr-TR" smtClean="0"/>
-              <a:t>24.09.2019</a:t>
+              <a:t>26.09.2019</a:t>
             </a:fld>
             <a:endParaRPr lang="tr-TR"/>
           </a:p>
@@ -2543,7 +2628,7 @@
           <a:p>
             <a:fld id="{5EB3015D-7E17-406D-9A1A-3B2ADCD0CF79}" type="datetime1">
               <a:rPr lang="tr-TR" smtClean="0"/>
-              <a:t>24.09.2019</a:t>
+              <a:t>26.09.2019</a:t>
             </a:fld>
             <a:endParaRPr lang="tr-TR"/>
           </a:p>
@@ -2796,7 +2881,7 @@
           <a:p>
             <a:fld id="{8E1B6673-63A0-461F-BFBD-58F4D74CC1A0}" type="datetime1">
               <a:rPr lang="tr-TR" smtClean="0"/>
-              <a:t>24.09.2019</a:t>
+              <a:t>26.09.2019</a:t>
             </a:fld>
             <a:endParaRPr lang="tr-TR"/>
           </a:p>
@@ -3009,7 +3094,7 @@
           <a:p>
             <a:fld id="{9E8EF2ED-7087-4201-9521-97BB02159B09}" type="datetime1">
               <a:rPr lang="tr-TR" smtClean="0"/>
-              <a:t>24.09.2019</a:t>
+              <a:t>26.09.2019</a:t>
             </a:fld>
             <a:endParaRPr lang="tr-TR"/>
           </a:p>
@@ -3784,6 +3869,249 @@
     <p:extLst>
       <p:ext uri="{BB962C8B-B14F-4D97-AF65-F5344CB8AC3E}">
         <p14:creationId xmlns:p14="http://schemas.microsoft.com/office/powerpoint/2010/main" val="3082183107"/>
+      </p:ext>
+    </p:extLst>
+  </p:cSld>
+  <p:clrMapOvr>
+    <a:masterClrMapping/>
+  </p:clrMapOvr>
+  <p:timing>
+    <p:tnLst>
+      <p:par>
+        <p:cTn id="1" dur="indefinite" restart="never" nodeType="tmRoot"/>
+      </p:par>
+    </p:tnLst>
+  </p:timing>
+</p:sld>
+</file>
+
+<file path=ppt/slides/slide10.xml><?xml version="1.0" encoding="utf-8"?>
+<p:sld xmlns:a="http://schemas.openxmlformats.org/drawingml/2006/main" xmlns:r="http://schemas.openxmlformats.org/officeDocument/2006/relationships" xmlns:p="http://schemas.openxmlformats.org/presentationml/2006/main">
+  <p:cSld>
+    <p:spTree>
+      <p:nvGrpSpPr>
+        <p:cNvPr id="1" name=""/>
+        <p:cNvGrpSpPr/>
+        <p:nvPr/>
+      </p:nvGrpSpPr>
+      <p:grpSpPr>
+        <a:xfrm>
+          <a:off x="0" y="0"/>
+          <a:ext cx="0" cy="0"/>
+          <a:chOff x="0" y="0"/>
+          <a:chExt cx="0" cy="0"/>
+        </a:xfrm>
+      </p:grpSpPr>
+      <p:sp>
+        <p:nvSpPr>
+          <p:cNvPr id="4" name="Slide Number Placeholder 3"/>
+          <p:cNvSpPr>
+            <a:spLocks noGrp="1"/>
+          </p:cNvSpPr>
+          <p:nvPr>
+            <p:ph type="sldNum" sz="quarter" idx="12"/>
+          </p:nvPr>
+        </p:nvSpPr>
+        <p:spPr/>
+        <p:txBody>
+          <a:bodyPr/>
+          <a:lstStyle/>
+          <a:p>
+            <a:fld id="{178508F5-8E49-4F57-B165-331DE2AB85B8}" type="slidenum">
+              <a:rPr lang="tr-TR" sz="1800" smtClean="0"/>
+              <a:t>10</a:t>
+            </a:fld>
+            <a:endParaRPr lang="tr-TR" sz="1800" dirty="0"/>
+          </a:p>
+        </p:txBody>
+      </p:sp>
+      <p:sp>
+        <p:nvSpPr>
+          <p:cNvPr id="5" name="TextBox 4"/>
+          <p:cNvSpPr txBox="1"/>
+          <p:nvPr/>
+        </p:nvSpPr>
+        <p:spPr>
+          <a:xfrm>
+            <a:off x="465992" y="219808"/>
+            <a:ext cx="5064370" cy="523220"/>
+          </a:xfrm>
+          <a:prstGeom prst="rect">
+            <a:avLst/>
+          </a:prstGeom>
+          <a:noFill/>
+        </p:spPr>
+        <p:txBody>
+          <a:bodyPr wrap="square" rtlCol="0">
+            <a:spAutoFit/>
+          </a:bodyPr>
+          <a:lstStyle/>
+          <a:p>
+            <a:r>
+              <a:rPr lang="tr-TR" sz="2800" dirty="0" smtClean="0"/>
+              <a:t>Heat Sink Selection – Option #6</a:t>
+            </a:r>
+            <a:endParaRPr lang="tr-TR" sz="2800" dirty="0"/>
+          </a:p>
+        </p:txBody>
+      </p:sp>
+      <p:sp>
+        <p:nvSpPr>
+          <p:cNvPr id="17" name="Rectangle 16"/>
+          <p:cNvSpPr/>
+          <p:nvPr/>
+        </p:nvSpPr>
+        <p:spPr>
+          <a:xfrm>
+            <a:off x="784347" y="6427120"/>
+            <a:ext cx="561372" cy="369332"/>
+          </a:xfrm>
+          <a:prstGeom prst="rect">
+            <a:avLst/>
+          </a:prstGeom>
+        </p:spPr>
+        <p:txBody>
+          <a:bodyPr wrap="none">
+            <a:spAutoFit/>
+          </a:bodyPr>
+          <a:lstStyle/>
+          <a:p>
+            <a:r>
+              <a:rPr lang="tr-TR" dirty="0" smtClean="0">
+                <a:hlinkClick r:id="rId3"/>
+              </a:rPr>
+              <a:t>Link</a:t>
+            </a:r>
+            <a:endParaRPr lang="tr-TR" dirty="0"/>
+          </a:p>
+        </p:txBody>
+      </p:sp>
+      <p:sp>
+        <p:nvSpPr>
+          <p:cNvPr id="12" name="TextBox 11"/>
+          <p:cNvSpPr txBox="1"/>
+          <p:nvPr/>
+        </p:nvSpPr>
+        <p:spPr>
+          <a:xfrm>
+            <a:off x="465992" y="4604496"/>
+            <a:ext cx="6520873" cy="369332"/>
+          </a:xfrm>
+          <a:prstGeom prst="rect">
+            <a:avLst/>
+          </a:prstGeom>
+          <a:noFill/>
+        </p:spPr>
+        <p:txBody>
+          <a:bodyPr wrap="square" rtlCol="0">
+            <a:spAutoFit/>
+          </a:bodyPr>
+          <a:lstStyle/>
+          <a:p>
+            <a:r>
+              <a:rPr lang="tr-TR" dirty="0" smtClean="0"/>
+              <a:t>L x W x H –37.5 x 37.5 x 33 – 2.4 C/W @ 100LFM, 1 m/s, </a:t>
+            </a:r>
+            <a:r>
+              <a:rPr lang="tr-TR" b="1" dirty="0" smtClean="0"/>
+              <a:t>1.51 CFM</a:t>
+            </a:r>
+            <a:endParaRPr lang="tr-TR" b="1" dirty="0"/>
+          </a:p>
+        </p:txBody>
+      </p:sp>
+      <p:pic>
+        <p:nvPicPr>
+          <p:cNvPr id="2" name="Picture 1"/>
+          <p:cNvPicPr>
+            <a:picLocks noChangeAspect="1"/>
+          </p:cNvPicPr>
+          <p:nvPr/>
+        </p:nvPicPr>
+        <p:blipFill>
+          <a:blip r:embed="rId4"/>
+          <a:stretch>
+            <a:fillRect/>
+          </a:stretch>
+        </p:blipFill>
+        <p:spPr>
+          <a:xfrm>
+            <a:off x="465992" y="811624"/>
+            <a:ext cx="4505325" cy="3724275"/>
+          </a:xfrm>
+          <a:prstGeom prst="rect">
+            <a:avLst/>
+          </a:prstGeom>
+        </p:spPr>
+      </p:pic>
+      <p:pic>
+        <p:nvPicPr>
+          <p:cNvPr id="3" name="Picture 2"/>
+          <p:cNvPicPr>
+            <a:picLocks noChangeAspect="1"/>
+          </p:cNvPicPr>
+          <p:nvPr/>
+        </p:nvPicPr>
+        <p:blipFill>
+          <a:blip r:embed="rId5"/>
+          <a:stretch>
+            <a:fillRect/>
+          </a:stretch>
+        </p:blipFill>
+        <p:spPr>
+          <a:xfrm>
+            <a:off x="5338396" y="743028"/>
+            <a:ext cx="4381500" cy="3629025"/>
+          </a:xfrm>
+          <a:prstGeom prst="rect">
+            <a:avLst/>
+          </a:prstGeom>
+        </p:spPr>
+      </p:pic>
+      <p:sp>
+        <p:nvSpPr>
+          <p:cNvPr id="10" name="5-Point Star 9"/>
+          <p:cNvSpPr/>
+          <p:nvPr/>
+        </p:nvSpPr>
+        <p:spPr>
+          <a:xfrm>
+            <a:off x="6764037" y="4512760"/>
+            <a:ext cx="445655" cy="461068"/>
+          </a:xfrm>
+          <a:prstGeom prst="star5">
+            <a:avLst/>
+          </a:prstGeom>
+        </p:spPr>
+        <p:style>
+          <a:lnRef idx="2">
+            <a:schemeClr val="accent1">
+              <a:shade val="50000"/>
+            </a:schemeClr>
+          </a:lnRef>
+          <a:fillRef idx="1">
+            <a:schemeClr val="accent1"/>
+          </a:fillRef>
+          <a:effectRef idx="0">
+            <a:schemeClr val="accent1"/>
+          </a:effectRef>
+          <a:fontRef idx="minor">
+            <a:schemeClr val="lt1"/>
+          </a:fontRef>
+        </p:style>
+        <p:txBody>
+          <a:bodyPr rtlCol="0" anchor="ctr"/>
+          <a:lstStyle/>
+          <a:p>
+            <a:pPr algn="ctr"/>
+            <a:endParaRPr lang="tr-TR"/>
+          </a:p>
+        </p:txBody>
+      </p:sp>
+    </p:spTree>
+    <p:extLst>
+      <p:ext uri="{BB962C8B-B14F-4D97-AF65-F5344CB8AC3E}">
+        <p14:creationId xmlns:p14="http://schemas.microsoft.com/office/powerpoint/2010/main" val="229714186"/>
       </p:ext>
     </p:extLst>
   </p:cSld>
@@ -6367,8 +6695,8 @@
           </a:p>
         </p:txBody>
       </p:sp>
-      <mc:AlternateContent xmlns:mc="http://schemas.openxmlformats.org/markup-compatibility/2006">
-        <mc:Choice xmlns:a14="http://schemas.microsoft.com/office/drawing/2010/main" Requires="a14">
+      <mc:AlternateContent xmlns:mc="http://schemas.openxmlformats.org/markup-compatibility/2006" xmlns:a14="http://schemas.microsoft.com/office/drawing/2010/main">
+        <mc:Choice Requires="a14">
           <p:sp>
             <p:nvSpPr>
               <p:cNvPr id="3" name="Rectangle 2"/>
@@ -6390,7 +6718,6 @@
               </a:bodyPr>
               <a:lstStyle/>
               <a:p>
-                <a:pPr/>
                 <a14:m>
                   <m:oMath xmlns:m="http://schemas.openxmlformats.org/officeDocument/2006/math">
                     <m:sSub>
@@ -6465,7 +6792,7 @@
             </p:txBody>
           </p:sp>
         </mc:Choice>
-        <mc:Fallback>
+        <mc:Fallback xmlns="">
           <p:sp>
             <p:nvSpPr>
               <p:cNvPr id="3" name="Rectangle 2"/>
@@ -6588,11 +6915,7 @@
           <a:p>
             <a:r>
               <a:rPr lang="tr-TR" sz="2800" dirty="0" smtClean="0"/>
-              <a:t>Heat Sink </a:t>
-            </a:r>
-            <a:r>
-              <a:rPr lang="tr-TR" sz="2800" dirty="0" smtClean="0"/>
-              <a:t>Selection – Option #1</a:t>
+              <a:t>Heat Sink Selection – Option #1</a:t>
             </a:r>
             <a:endParaRPr lang="tr-TR" sz="2800" dirty="0"/>
           </a:p>
@@ -6977,11 +7300,7 @@
           <a:p>
             <a:r>
               <a:rPr lang="tr-TR" sz="2800" dirty="0" smtClean="0"/>
-              <a:t>Heat Sink </a:t>
-            </a:r>
-            <a:r>
-              <a:rPr lang="tr-TR" sz="2800" dirty="0" smtClean="0"/>
-              <a:t>Selection – Option #2</a:t>
+              <a:t>Heat Sink Selection – Option #2</a:t>
             </a:r>
             <a:endParaRPr lang="tr-TR" sz="2800" dirty="0"/>
           </a:p>
@@ -7249,11 +7568,7 @@
           <a:p>
             <a:r>
               <a:rPr lang="tr-TR" sz="2800" dirty="0" smtClean="0"/>
-              <a:t>Heat Sink </a:t>
-            </a:r>
-            <a:r>
-              <a:rPr lang="tr-TR" sz="2800" dirty="0" smtClean="0"/>
-              <a:t>Selection – Option #3</a:t>
+              <a:t>Heat Sink Selection – Option #3</a:t>
             </a:r>
             <a:endParaRPr lang="tr-TR" sz="2800" dirty="0"/>
           </a:p>
@@ -7456,11 +7771,7 @@
           <a:p>
             <a:r>
               <a:rPr lang="tr-TR" sz="2800" dirty="0" smtClean="0"/>
-              <a:t>Heat Sink </a:t>
-            </a:r>
-            <a:r>
-              <a:rPr lang="tr-TR" sz="2800" dirty="0" smtClean="0"/>
-              <a:t>Selection – Option #4</a:t>
+              <a:t>Heat Sink Selection – Option #4</a:t>
             </a:r>
             <a:endParaRPr lang="tr-TR" sz="2800" dirty="0"/>
           </a:p>
@@ -7737,11 +8048,7 @@
           <a:p>
             <a:r>
               <a:rPr lang="tr-TR" sz="2800" dirty="0" smtClean="0"/>
-              <a:t>Heat Sink </a:t>
-            </a:r>
-            <a:r>
-              <a:rPr lang="tr-TR" sz="2800" dirty="0" smtClean="0"/>
-              <a:t>Selection – Option #5</a:t>
+              <a:t>Heat Sink Selection – Option #5</a:t>
             </a:r>
             <a:endParaRPr lang="tr-TR" sz="2800" dirty="0"/>
           </a:p>

</xml_diff>

<commit_message>
Weekly report is added.
</commit_message>
<xml_diff>
--- a/Weekly Reports/2019.09.18 - 2019.09.25 Report.pptx
+++ b/Weekly Reports/2019.09.18 - 2019.09.25 Report.pptx
@@ -206,7 +206,7 @@
           <a:p>
             <a:fld id="{6967AB47-6931-48C6-B7ED-326D1228AFBA}" type="datetimeFigureOut">
               <a:rPr lang="tr-TR" smtClean="0"/>
-              <a:t>26.09.2019</a:t>
+              <a:t>16.01.2020</a:t>
             </a:fld>
             <a:endParaRPr lang="tr-TR"/>
           </a:p>
@@ -773,7 +773,7 @@
           <a:p>
             <a:fld id="{BD3B3769-65FE-41EA-85B6-D9F2AF76CBA9}" type="datetime1">
               <a:rPr lang="tr-TR" smtClean="0"/>
-              <a:t>26.09.2019</a:t>
+              <a:t>16.01.2020</a:t>
             </a:fld>
             <a:endParaRPr lang="tr-TR"/>
           </a:p>
@@ -943,7 +943,7 @@
           <a:p>
             <a:fld id="{2962A6A9-D976-4BDA-B10C-66B2B9DE9B4C}" type="datetime1">
               <a:rPr lang="tr-TR" smtClean="0"/>
-              <a:t>26.09.2019</a:t>
+              <a:t>16.01.2020</a:t>
             </a:fld>
             <a:endParaRPr lang="tr-TR"/>
           </a:p>
@@ -1123,7 +1123,7 @@
           <a:p>
             <a:fld id="{5600552A-E4D4-4B40-9929-1D3FB71F71FF}" type="datetime1">
               <a:rPr lang="tr-TR" smtClean="0"/>
-              <a:t>26.09.2019</a:t>
+              <a:t>16.01.2020</a:t>
             </a:fld>
             <a:endParaRPr lang="tr-TR"/>
           </a:p>
@@ -1293,7 +1293,7 @@
           <a:p>
             <a:fld id="{F9A85ECC-3CE4-4AD0-8EC5-3A36763AA76F}" type="datetime1">
               <a:rPr lang="tr-TR" smtClean="0"/>
-              <a:t>26.09.2019</a:t>
+              <a:t>16.01.2020</a:t>
             </a:fld>
             <a:endParaRPr lang="tr-TR"/>
           </a:p>
@@ -1539,7 +1539,7 @@
           <a:p>
             <a:fld id="{39F6AA4B-9646-44CC-B325-B50A183D6636}" type="datetime1">
               <a:rPr lang="tr-TR" smtClean="0"/>
-              <a:t>26.09.2019</a:t>
+              <a:t>16.01.2020</a:t>
             </a:fld>
             <a:endParaRPr lang="tr-TR"/>
           </a:p>
@@ -1771,7 +1771,7 @@
           <a:p>
             <a:fld id="{FD69D89B-A78C-481C-B4BE-82E51E30BA9C}" type="datetime1">
               <a:rPr lang="tr-TR" smtClean="0"/>
-              <a:t>26.09.2019</a:t>
+              <a:t>16.01.2020</a:t>
             </a:fld>
             <a:endParaRPr lang="tr-TR"/>
           </a:p>
@@ -2138,7 +2138,7 @@
           <a:p>
             <a:fld id="{473BE270-57FE-4717-982D-F02DFB5BECD5}" type="datetime1">
               <a:rPr lang="tr-TR" smtClean="0"/>
-              <a:t>26.09.2019</a:t>
+              <a:t>16.01.2020</a:t>
             </a:fld>
             <a:endParaRPr lang="tr-TR"/>
           </a:p>
@@ -2256,7 +2256,7 @@
           <a:p>
             <a:fld id="{BFAEDD45-6991-4862-9E84-DDF92EF341CB}" type="datetime1">
               <a:rPr lang="tr-TR" smtClean="0"/>
-              <a:t>26.09.2019</a:t>
+              <a:t>16.01.2020</a:t>
             </a:fld>
             <a:endParaRPr lang="tr-TR"/>
           </a:p>
@@ -2351,7 +2351,7 @@
           <a:p>
             <a:fld id="{23EE56C6-14E9-4870-96BE-3550760A1300}" type="datetime1">
               <a:rPr lang="tr-TR" smtClean="0"/>
-              <a:t>26.09.2019</a:t>
+              <a:t>16.01.2020</a:t>
             </a:fld>
             <a:endParaRPr lang="tr-TR"/>
           </a:p>
@@ -2628,7 +2628,7 @@
           <a:p>
             <a:fld id="{5EB3015D-7E17-406D-9A1A-3B2ADCD0CF79}" type="datetime1">
               <a:rPr lang="tr-TR" smtClean="0"/>
-              <a:t>26.09.2019</a:t>
+              <a:t>16.01.2020</a:t>
             </a:fld>
             <a:endParaRPr lang="tr-TR"/>
           </a:p>
@@ -2881,7 +2881,7 @@
           <a:p>
             <a:fld id="{8E1B6673-63A0-461F-BFBD-58F4D74CC1A0}" type="datetime1">
               <a:rPr lang="tr-TR" smtClean="0"/>
-              <a:t>26.09.2019</a:t>
+              <a:t>16.01.2020</a:t>
             </a:fld>
             <a:endParaRPr lang="tr-TR"/>
           </a:p>
@@ -3094,7 +3094,7 @@
           <a:p>
             <a:fld id="{9E8EF2ED-7087-4201-9521-97BB02159B09}" type="datetime1">
               <a:rPr lang="tr-TR" smtClean="0"/>
-              <a:t>26.09.2019</a:t>
+              <a:t>16.01.2020</a:t>
             </a:fld>
             <a:endParaRPr lang="tr-TR"/>
           </a:p>

</xml_diff>